<commit_message>
log + input validation
</commit_message>
<xml_diff>
--- a/doc/Documentazione/Implementazione/Amazon.pptx
+++ b/doc/Documentazione/Implementazione/Amazon.pptx
@@ -23820,7 +23820,7 @@
           <a:p>
             <a:fld id="{AF869721-F543-4A6C-BF9D-65D7CC540427}" type="datetimeFigureOut">
               <a:rPr lang="en-US" smtClean="0"/>
-              <a:t>12/7/2022</a:t>
+              <a:t>12/13/2022</a:t>
             </a:fld>
             <a:endParaRPr lang="en-US" dirty="0"/>
           </a:p>
@@ -23997,7 +23997,7 @@
           <a:p>
             <a:fld id="{C732326A-4C88-4AFB-AA5B-5919D81DFF5B}" type="datetimeFigureOut">
               <a:rPr lang="en-US" smtClean="0"/>
-              <a:t>12/7/2022</a:t>
+              <a:t>12/13/2022</a:t>
             </a:fld>
             <a:endParaRPr lang="en-US" dirty="0"/>
           </a:p>
@@ -25098,7 +25098,7 @@
             <a:fld id="{B61BEF0D-F0BB-DE4B-95CE-6DB70DBA9567}" type="datetimeFigureOut">
               <a:rPr lang="en-US" smtClean="0"/>
               <a:pPr/>
-              <a:t>12/7/2022</a:t>
+              <a:t>12/13/2022</a:t>
             </a:fld>
             <a:endParaRPr lang="en-US" dirty="0"/>
           </a:p>
@@ -25362,7 +25362,7 @@
             <a:fld id="{B61BEF0D-F0BB-DE4B-95CE-6DB70DBA9567}" type="datetimeFigureOut">
               <a:rPr lang="en-US" smtClean="0"/>
               <a:pPr/>
-              <a:t>12/7/2022</a:t>
+              <a:t>12/13/2022</a:t>
             </a:fld>
             <a:endParaRPr lang="en-US" dirty="0"/>
           </a:p>
@@ -25599,7 +25599,7 @@
             <a:fld id="{B61BEF0D-F0BB-DE4B-95CE-6DB70DBA9567}" type="datetimeFigureOut">
               <a:rPr lang="en-US" smtClean="0"/>
               <a:pPr/>
-              <a:t>12/7/2022</a:t>
+              <a:t>12/13/2022</a:t>
             </a:fld>
             <a:endParaRPr lang="en-US" dirty="0"/>
           </a:p>
@@ -25841,7 +25841,7 @@
             <a:fld id="{B61BEF0D-F0BB-DE4B-95CE-6DB70DBA9567}" type="datetimeFigureOut">
               <a:rPr lang="en-US" smtClean="0"/>
               <a:pPr/>
-              <a:t>12/7/2022</a:t>
+              <a:t>12/13/2022</a:t>
             </a:fld>
             <a:endParaRPr lang="en-US" dirty="0"/>
           </a:p>
@@ -26150,7 +26150,7 @@
             <a:fld id="{B61BEF0D-F0BB-DE4B-95CE-6DB70DBA9567}" type="datetimeFigureOut">
               <a:rPr lang="en-US" smtClean="0"/>
               <a:pPr/>
-              <a:t>12/7/2022</a:t>
+              <a:t>12/13/2022</a:t>
             </a:fld>
             <a:endParaRPr lang="en-US" dirty="0"/>
           </a:p>
@@ -26454,7 +26454,7 @@
             <a:fld id="{B61BEF0D-F0BB-DE4B-95CE-6DB70DBA9567}" type="datetimeFigureOut">
               <a:rPr lang="en-US" smtClean="0"/>
               <a:pPr/>
-              <a:t>12/7/2022</a:t>
+              <a:t>12/13/2022</a:t>
             </a:fld>
             <a:endParaRPr lang="en-US" dirty="0"/>
           </a:p>
@@ -26878,7 +26878,7 @@
             <a:fld id="{B61BEF0D-F0BB-DE4B-95CE-6DB70DBA9567}" type="datetimeFigureOut">
               <a:rPr lang="en-US" smtClean="0"/>
               <a:pPr/>
-              <a:t>12/7/2022</a:t>
+              <a:t>12/13/2022</a:t>
             </a:fld>
             <a:endParaRPr lang="en-US" dirty="0"/>
           </a:p>
@@ -26975,7 +26975,7 @@
             <a:fld id="{B61BEF0D-F0BB-DE4B-95CE-6DB70DBA9567}" type="datetimeFigureOut">
               <a:rPr lang="en-US" smtClean="0"/>
               <a:pPr/>
-              <a:t>12/7/2022</a:t>
+              <a:t>12/13/2022</a:t>
             </a:fld>
             <a:endParaRPr lang="en-US" dirty="0"/>
           </a:p>
@@ -27139,7 +27139,7 @@
             <a:fld id="{B61BEF0D-F0BB-DE4B-95CE-6DB70DBA9567}" type="datetimeFigureOut">
               <a:rPr lang="en-US" smtClean="0"/>
               <a:pPr/>
-              <a:t>12/7/2022</a:t>
+              <a:t>12/13/2022</a:t>
             </a:fld>
             <a:endParaRPr lang="en-US" dirty="0"/>
           </a:p>
@@ -27519,7 +27519,7 @@
             <a:fld id="{B61BEF0D-F0BB-DE4B-95CE-6DB70DBA9567}" type="datetimeFigureOut">
               <a:rPr lang="en-US" smtClean="0"/>
               <a:pPr/>
-              <a:t>12/7/2022</a:t>
+              <a:t>12/13/2022</a:t>
             </a:fld>
             <a:endParaRPr lang="en-US" dirty="0"/>
           </a:p>
@@ -27810,7 +27810,7 @@
             <a:fld id="{B61BEF0D-F0BB-DE4B-95CE-6DB70DBA9567}" type="datetimeFigureOut">
               <a:rPr lang="en-US" smtClean="0"/>
               <a:pPr/>
-              <a:t>12/7/2022</a:t>
+              <a:t>12/13/2022</a:t>
             </a:fld>
             <a:endParaRPr lang="en-US" dirty="0"/>
           </a:p>
@@ -28023,7 +28023,7 @@
             <a:fld id="{B61BEF0D-F0BB-DE4B-95CE-6DB70DBA9567}" type="datetimeFigureOut">
               <a:rPr lang="en-US" smtClean="0"/>
               <a:pPr/>
-              <a:t>12/7/2022</a:t>
+              <a:t>12/13/2022</a:t>
             </a:fld>
             <a:endParaRPr lang="en-US" dirty="0"/>
           </a:p>
@@ -29136,6 +29136,7 @@
           </a:bodyPr>
           <a:lstStyle/>
           <a:p>
+            <a:pPr algn="just"/>
             <a:r>
               <a:rPr lang="it-IT" b="0" i="0" dirty="0">
                 <a:solidFill>
@@ -29234,6 +29235,7 @@
             </a:r>
           </a:p>
           <a:p>
+            <a:pPr algn="just"/>
             <a:r>
               <a:rPr lang="it-IT" dirty="0"/>
               <a:t>Offre sicurezza avanzata con AWS Nitro System, la piattaforma sottostante le istanze EC2.  Le risorse EC2 vengono assemblate su chip di sicurezza ad alta sicurezza poiché le funzioni di virtualizzazione e sicurezza sono deviate su hardware e software dedicati con il divieto di accesso amministrativo, eliminando la possibilità di manomissioni e riducendo la superficie di attacco. Inoltre si utilizza una funzionalità di sicurezza </a:t>
@@ -29280,6 +29282,7 @@
           </a:bodyPr>
           <a:lstStyle/>
           <a:p>
+            <a:pPr algn="just"/>
             <a:r>
               <a:rPr lang="it-IT" dirty="0"/>
               <a:t>AWS KMS </a:t>
@@ -34914,6 +34917,15 @@
 </file>
 
 <file path=customXml/item1.xml><?xml version="1.0" encoding="utf-8"?>
+<?mso-contentType ?>
+<FormTemplates xmlns="http://schemas.microsoft.com/sharepoint/v3/contenttype/forms">
+  <Display>DocumentLibraryForm</Display>
+  <Edit>DocumentLibraryForm</Edit>
+  <New>DocumentLibraryForm</New>
+</FormTemplates>
+</file>
+
+<file path=customXml/item2.xml><?xml version="1.0" encoding="utf-8"?>
 <ct:contentTypeSchema xmlns:ct="http://schemas.microsoft.com/office/2006/metadata/contentType" xmlns:ma="http://schemas.microsoft.com/office/2006/metadata/properties/metaAttributes" ct:_="" ma:_="" ma:contentTypeName="Document" ma:contentTypeID="0x0101001FF3CDC142E59F46976220B5CA0CB5FC" ma:contentTypeVersion="2" ma:contentTypeDescription="Create a new document." ma:contentTypeScope="" ma:versionID="aef8504347a4dbeb7265cbe712be104a">
   <xsd:schema xmlns:xsd="http://www.w3.org/2001/XMLSchema" xmlns:xs="http://www.w3.org/2001/XMLSchema" xmlns:p="http://schemas.microsoft.com/office/2006/metadata/properties" xmlns:ns2="78bd1115-c349-4e94-811d-d06a7ae9090b" targetNamespace="http://schemas.microsoft.com/office/2006/metadata/properties" ma:root="true" ma:fieldsID="65563b94d1f17f8f0118868949f17d27" ns2:_="">
     <xsd:import namespace="78bd1115-c349-4e94-811d-d06a7ae9090b"/>
@@ -35045,15 +35057,6 @@
 </ct:contentTypeSchema>
 </file>
 
-<file path=customXml/item2.xml><?xml version="1.0" encoding="utf-8"?>
-<?mso-contentType ?>
-<FormTemplates xmlns="http://schemas.microsoft.com/sharepoint/v3/contenttype/forms">
-  <Display>DocumentLibraryForm</Display>
-  <Edit>DocumentLibraryForm</Edit>
-  <New>DocumentLibraryForm</New>
-</FormTemplates>
-</file>
-
 <file path=customXml/item3.xml><?xml version="1.0" encoding="utf-8"?>
 <p:properties xmlns:p="http://schemas.microsoft.com/office/2006/metadata/properties" xmlns:xsi="http://www.w3.org/2001/XMLSchema-instance" xmlns:pc="http://schemas.microsoft.com/office/infopath/2007/PartnerControls">
   <documentManagement/>
@@ -35061,13 +35064,27 @@
 </file>
 
 <file path=customXml/itemProps1.xml><?xml version="1.0" encoding="utf-8"?>
-<ds:datastoreItem xmlns:ds="http://schemas.openxmlformats.org/officeDocument/2006/customXml" ds:itemID="{4CA83D19-7416-45FC-AD3B-E3AB59B9ED54}"/>
+<ds:datastoreItem xmlns:ds="http://schemas.openxmlformats.org/officeDocument/2006/customXml" ds:itemID="{55895A41-F65A-4D7F-8780-A8AB39E16755}">
+  <ds:schemaRefs>
+    <ds:schemaRef ds:uri="http://schemas.microsoft.com/sharepoint/v3/contenttype/forms"/>
+  </ds:schemaRefs>
+</ds:datastoreItem>
 </file>
 
 <file path=customXml/itemProps2.xml><?xml version="1.0" encoding="utf-8"?>
-<ds:datastoreItem xmlns:ds="http://schemas.openxmlformats.org/officeDocument/2006/customXml" ds:itemID="{55895A41-F65A-4D7F-8780-A8AB39E16755}">
+<ds:datastoreItem xmlns:ds="http://schemas.openxmlformats.org/officeDocument/2006/customXml" ds:itemID="{4CA83D19-7416-45FC-AD3B-E3AB59B9ED54}">
   <ds:schemaRefs>
-    <ds:schemaRef ds:uri="http://schemas.microsoft.com/sharepoint/v3/contenttype/forms"/>
+    <ds:schemaRef ds:uri="http://schemas.microsoft.com/office/2006/metadata/contentType"/>
+    <ds:schemaRef ds:uri="http://schemas.microsoft.com/office/2006/metadata/properties/metaAttributes"/>
+    <ds:schemaRef ds:uri="http://www.w3.org/2001/XMLSchema"/>
+    <ds:schemaRef ds:uri="http://schemas.microsoft.com/office/2006/metadata/properties"/>
+    <ds:schemaRef ds:uri="78bd1115-c349-4e94-811d-d06a7ae9090b"/>
+    <ds:schemaRef ds:uri="http://schemas.microsoft.com/office/2006/documentManagement/types"/>
+    <ds:schemaRef ds:uri="http://schemas.microsoft.com/office/infopath/2007/PartnerControls"/>
+    <ds:schemaRef ds:uri="http://schemas.openxmlformats.org/package/2006/metadata/core-properties"/>
+    <ds:schemaRef ds:uri="http://purl.org/dc/elements/1.1/"/>
+    <ds:schemaRef ds:uri="http://purl.org/dc/terms/"/>
+    <ds:schemaRef ds:uri="http://schemas.microsoft.com/internal/obd"/>
   </ds:schemaRefs>
 </ds:datastoreItem>
 </file>

</xml_diff>